<commit_message>
FP brightness levels now incorporated
</commit_message>
<xml_diff>
--- a/CWRU_Flow_FPs.pptx
+++ b/CWRU_Flow_FPs.pptx
@@ -260,7 +260,7 @@
           <a:p>
             <a:fld id="{75DC174B-3D36-5849-A443-D58DC242DE4F}" type="datetimeFigureOut">
               <a:rPr lang="en-US" smtClean="0"/>
-              <a:t>8/10/20</a:t>
+              <a:t>8/11/20</a:t>
             </a:fld>
             <a:endParaRPr lang="en-US"/>
           </a:p>
@@ -458,7 +458,7 @@
           <a:p>
             <a:fld id="{75DC174B-3D36-5849-A443-D58DC242DE4F}" type="datetimeFigureOut">
               <a:rPr lang="en-US" smtClean="0"/>
-              <a:t>8/10/20</a:t>
+              <a:t>8/11/20</a:t>
             </a:fld>
             <a:endParaRPr lang="en-US"/>
           </a:p>
@@ -666,7 +666,7 @@
           <a:p>
             <a:fld id="{75DC174B-3D36-5849-A443-D58DC242DE4F}" type="datetimeFigureOut">
               <a:rPr lang="en-US" smtClean="0"/>
-              <a:t>8/10/20</a:t>
+              <a:t>8/11/20</a:t>
             </a:fld>
             <a:endParaRPr lang="en-US"/>
           </a:p>
@@ -864,7 +864,7 @@
           <a:p>
             <a:fld id="{75DC174B-3D36-5849-A443-D58DC242DE4F}" type="datetimeFigureOut">
               <a:rPr lang="en-US" smtClean="0"/>
-              <a:t>8/10/20</a:t>
+              <a:t>8/11/20</a:t>
             </a:fld>
             <a:endParaRPr lang="en-US"/>
           </a:p>
@@ -1139,7 +1139,7 @@
           <a:p>
             <a:fld id="{75DC174B-3D36-5849-A443-D58DC242DE4F}" type="datetimeFigureOut">
               <a:rPr lang="en-US" smtClean="0"/>
-              <a:t>8/10/20</a:t>
+              <a:t>8/11/20</a:t>
             </a:fld>
             <a:endParaRPr lang="en-US"/>
           </a:p>
@@ -1404,7 +1404,7 @@
           <a:p>
             <a:fld id="{75DC174B-3D36-5849-A443-D58DC242DE4F}" type="datetimeFigureOut">
               <a:rPr lang="en-US" smtClean="0"/>
-              <a:t>8/10/20</a:t>
+              <a:t>8/11/20</a:t>
             </a:fld>
             <a:endParaRPr lang="en-US"/>
           </a:p>
@@ -1816,7 +1816,7 @@
           <a:p>
             <a:fld id="{75DC174B-3D36-5849-A443-D58DC242DE4F}" type="datetimeFigureOut">
               <a:rPr lang="en-US" smtClean="0"/>
-              <a:t>8/10/20</a:t>
+              <a:t>8/11/20</a:t>
             </a:fld>
             <a:endParaRPr lang="en-US"/>
           </a:p>
@@ -1957,7 +1957,7 @@
           <a:p>
             <a:fld id="{75DC174B-3D36-5849-A443-D58DC242DE4F}" type="datetimeFigureOut">
               <a:rPr lang="en-US" smtClean="0"/>
-              <a:t>8/10/20</a:t>
+              <a:t>8/11/20</a:t>
             </a:fld>
             <a:endParaRPr lang="en-US"/>
           </a:p>
@@ -2070,7 +2070,7 @@
           <a:p>
             <a:fld id="{75DC174B-3D36-5849-A443-D58DC242DE4F}" type="datetimeFigureOut">
               <a:rPr lang="en-US" smtClean="0"/>
-              <a:t>8/10/20</a:t>
+              <a:t>8/11/20</a:t>
             </a:fld>
             <a:endParaRPr lang="en-US"/>
           </a:p>
@@ -2381,7 +2381,7 @@
           <a:p>
             <a:fld id="{75DC174B-3D36-5849-A443-D58DC242DE4F}" type="datetimeFigureOut">
               <a:rPr lang="en-US" smtClean="0"/>
-              <a:t>8/10/20</a:t>
+              <a:t>8/11/20</a:t>
             </a:fld>
             <a:endParaRPr lang="en-US"/>
           </a:p>
@@ -2669,7 +2669,7 @@
           <a:p>
             <a:fld id="{75DC174B-3D36-5849-A443-D58DC242DE4F}" type="datetimeFigureOut">
               <a:rPr lang="en-US" smtClean="0"/>
-              <a:t>8/10/20</a:t>
+              <a:t>8/11/20</a:t>
             </a:fld>
             <a:endParaRPr lang="en-US"/>
           </a:p>
@@ -2910,7 +2910,7 @@
           <a:p>
             <a:fld id="{75DC174B-3D36-5849-A443-D58DC242DE4F}" type="datetimeFigureOut">
               <a:rPr lang="en-US" smtClean="0"/>
-              <a:t>8/10/20</a:t>
+              <a:t>8/11/20</a:t>
             </a:fld>
             <a:endParaRPr lang="en-US"/>
           </a:p>
@@ -3327,12 +3327,47 @@
           <a:chExt cx="0" cy="0"/>
         </a:xfrm>
       </p:grpSpPr>
+      <p:sp>
+        <p:nvSpPr>
+          <p:cNvPr id="2" name="TextBox 1">
+            <a:extLst>
+              <a:ext uri="{FF2B5EF4-FFF2-40B4-BE49-F238E27FC236}">
+                <a16:creationId xmlns:a16="http://schemas.microsoft.com/office/drawing/2014/main" id="{9A260BA1-7B40-BA43-9619-2D760D0F2637}"/>
+              </a:ext>
+            </a:extLst>
+          </p:cNvPr>
+          <p:cNvSpPr txBox="1"/>
+          <p:nvPr/>
+        </p:nvSpPr>
+        <p:spPr>
+          <a:xfrm>
+            <a:off x="0" y="0"/>
+            <a:ext cx="5097780" cy="369332"/>
+          </a:xfrm>
+          <a:prstGeom prst="rect">
+            <a:avLst/>
+          </a:prstGeom>
+          <a:noFill/>
+        </p:spPr>
+        <p:txBody>
+          <a:bodyPr wrap="square" rtlCol="0">
+            <a:spAutoFit/>
+          </a:bodyPr>
+          <a:lstStyle/>
+          <a:p>
+            <a:r>
+              <a:rPr lang="en-US" dirty="0"/>
+              <a:t>Attune</a:t>
+            </a:r>
+          </a:p>
+        </p:txBody>
+      </p:sp>
       <p:pic>
         <p:nvPicPr>
-          <p:cNvPr id="7" name="Picture 6">
-            <a:extLst>
-              <a:ext uri="{FF2B5EF4-FFF2-40B4-BE49-F238E27FC236}">
-                <a16:creationId xmlns:a16="http://schemas.microsoft.com/office/drawing/2014/main" id="{61E5CE01-758B-D241-88E3-2EE0149A60D1}"/>
+          <p:cNvPr id="4" name="Picture 3">
+            <a:extLst>
+              <a:ext uri="{FF2B5EF4-FFF2-40B4-BE49-F238E27FC236}">
+                <a16:creationId xmlns:a16="http://schemas.microsoft.com/office/drawing/2014/main" id="{D1837CE7-4C98-DB4E-8692-D69BF2BBDEC8}"/>
               </a:ext>
             </a:extLst>
           </p:cNvPr>
@@ -3349,7 +3384,7 @@
         </p:blipFill>
         <p:spPr>
           <a:xfrm>
-            <a:off x="2996308" y="1074445"/>
+            <a:off x="938908" y="1074445"/>
             <a:ext cx="2057400" cy="2743200"/>
           </a:xfrm>
           <a:prstGeom prst="rect">
@@ -3359,10 +3394,10 @@
       </p:pic>
       <p:pic>
         <p:nvPicPr>
-          <p:cNvPr id="9" name="Picture 8">
-            <a:extLst>
-              <a:ext uri="{FF2B5EF4-FFF2-40B4-BE49-F238E27FC236}">
-                <a16:creationId xmlns:a16="http://schemas.microsoft.com/office/drawing/2014/main" id="{FA10B30E-59E5-DB47-9628-F6B05F52F225}"/>
+          <p:cNvPr id="6" name="Picture 5">
+            <a:extLst>
+              <a:ext uri="{FF2B5EF4-FFF2-40B4-BE49-F238E27FC236}">
+                <a16:creationId xmlns:a16="http://schemas.microsoft.com/office/drawing/2014/main" id="{DB44A84F-761C-C84F-9249-BB6BA1D06C55}"/>
               </a:ext>
             </a:extLst>
           </p:cNvPr>
@@ -3379,7 +3414,7 @@
         </p:blipFill>
         <p:spPr>
           <a:xfrm>
-            <a:off x="938908" y="3817645"/>
+            <a:off x="2996308" y="1074445"/>
             <a:ext cx="2057400" cy="2743200"/>
           </a:xfrm>
           <a:prstGeom prst="rect">
@@ -3389,10 +3424,10 @@
       </p:pic>
       <p:pic>
         <p:nvPicPr>
-          <p:cNvPr id="11" name="Picture 10">
-            <a:extLst>
-              <a:ext uri="{FF2B5EF4-FFF2-40B4-BE49-F238E27FC236}">
-                <a16:creationId xmlns:a16="http://schemas.microsoft.com/office/drawing/2014/main" id="{65BDEE39-959F-E244-92A5-839401206650}"/>
+          <p:cNvPr id="10" name="Picture 9">
+            <a:extLst>
+              <a:ext uri="{FF2B5EF4-FFF2-40B4-BE49-F238E27FC236}">
+                <a16:creationId xmlns:a16="http://schemas.microsoft.com/office/drawing/2014/main" id="{B4D4FCAC-86B8-4540-93E3-DD12B75E8FFC}"/>
               </a:ext>
             </a:extLst>
           </p:cNvPr>
@@ -3409,7 +3444,7 @@
         </p:blipFill>
         <p:spPr>
           <a:xfrm>
-            <a:off x="9168508" y="1074445"/>
+            <a:off x="5053708" y="1074445"/>
             <a:ext cx="2057400" cy="2743200"/>
           </a:xfrm>
           <a:prstGeom prst="rect">
@@ -3419,10 +3454,10 @@
       </p:pic>
       <p:pic>
         <p:nvPicPr>
-          <p:cNvPr id="15" name="Picture 14">
-            <a:extLst>
-              <a:ext uri="{FF2B5EF4-FFF2-40B4-BE49-F238E27FC236}">
-                <a16:creationId xmlns:a16="http://schemas.microsoft.com/office/drawing/2014/main" id="{38D591CE-580D-2744-9B6C-BFB856E5718C}"/>
+          <p:cNvPr id="13" name="Picture 12">
+            <a:extLst>
+              <a:ext uri="{FF2B5EF4-FFF2-40B4-BE49-F238E27FC236}">
+                <a16:creationId xmlns:a16="http://schemas.microsoft.com/office/drawing/2014/main" id="{F23A16A0-3A0B-4846-9A5B-05C48864C80A}"/>
               </a:ext>
             </a:extLst>
           </p:cNvPr>
@@ -3439,7 +3474,7 @@
         </p:blipFill>
         <p:spPr>
           <a:xfrm>
-            <a:off x="2996308" y="3817645"/>
+            <a:off x="7111108" y="1074445"/>
             <a:ext cx="2057400" cy="2743200"/>
           </a:xfrm>
           <a:prstGeom prst="rect">
@@ -3449,10 +3484,10 @@
       </p:pic>
       <p:pic>
         <p:nvPicPr>
-          <p:cNvPr id="17" name="Picture 16">
-            <a:extLst>
-              <a:ext uri="{FF2B5EF4-FFF2-40B4-BE49-F238E27FC236}">
-                <a16:creationId xmlns:a16="http://schemas.microsoft.com/office/drawing/2014/main" id="{ED62A44B-2E90-F64B-8064-F6E2B8AFC677}"/>
+          <p:cNvPr id="16" name="Picture 15">
+            <a:extLst>
+              <a:ext uri="{FF2B5EF4-FFF2-40B4-BE49-F238E27FC236}">
+                <a16:creationId xmlns:a16="http://schemas.microsoft.com/office/drawing/2014/main" id="{080CE52A-7D64-0046-B9AA-7EC7263273C9}"/>
               </a:ext>
             </a:extLst>
           </p:cNvPr>
@@ -3469,7 +3504,7 @@
         </p:blipFill>
         <p:spPr>
           <a:xfrm>
-            <a:off x="5053708" y="3817645"/>
+            <a:off x="938908" y="3817645"/>
             <a:ext cx="2057400" cy="2743200"/>
           </a:xfrm>
           <a:prstGeom prst="rect">
@@ -3479,10 +3514,10 @@
       </p:pic>
       <p:pic>
         <p:nvPicPr>
-          <p:cNvPr id="21" name="Picture 20">
-            <a:extLst>
-              <a:ext uri="{FF2B5EF4-FFF2-40B4-BE49-F238E27FC236}">
-                <a16:creationId xmlns:a16="http://schemas.microsoft.com/office/drawing/2014/main" id="{1358C34A-EDE2-3848-B9D4-C60A2B319F77}"/>
+          <p:cNvPr id="19" name="Picture 18">
+            <a:extLst>
+              <a:ext uri="{FF2B5EF4-FFF2-40B4-BE49-F238E27FC236}">
+                <a16:creationId xmlns:a16="http://schemas.microsoft.com/office/drawing/2014/main" id="{8892516A-BDB8-B541-AEFA-E5DC2D03AA62}"/>
               </a:ext>
             </a:extLst>
           </p:cNvPr>
@@ -3499,7 +3534,7 @@
         </p:blipFill>
         <p:spPr>
           <a:xfrm>
-            <a:off x="7111108" y="1074445"/>
+            <a:off x="2996308" y="3817645"/>
             <a:ext cx="2057400" cy="2743200"/>
           </a:xfrm>
           <a:prstGeom prst="rect">
@@ -3509,10 +3544,10 @@
       </p:pic>
       <p:pic>
         <p:nvPicPr>
-          <p:cNvPr id="23" name="Picture 22">
-            <a:extLst>
-              <a:ext uri="{FF2B5EF4-FFF2-40B4-BE49-F238E27FC236}">
-                <a16:creationId xmlns:a16="http://schemas.microsoft.com/office/drawing/2014/main" id="{AAC8A2A2-1D0F-D848-8EF6-6A92BE4617AB}"/>
+          <p:cNvPr id="26" name="Picture 25">
+            <a:extLst>
+              <a:ext uri="{FF2B5EF4-FFF2-40B4-BE49-F238E27FC236}">
+                <a16:creationId xmlns:a16="http://schemas.microsoft.com/office/drawing/2014/main" id="{16DCEBF7-FD3D-B843-B3B5-D599EF116EB5}"/>
               </a:ext>
             </a:extLst>
           </p:cNvPr>
@@ -3529,7 +3564,7 @@
         </p:blipFill>
         <p:spPr>
           <a:xfrm>
-            <a:off x="938908" y="1074445"/>
+            <a:off x="5053708" y="3817645"/>
             <a:ext cx="2057400" cy="2743200"/>
           </a:xfrm>
           <a:prstGeom prst="rect">
@@ -3539,10 +3574,10 @@
       </p:pic>
       <p:pic>
         <p:nvPicPr>
-          <p:cNvPr id="25" name="Picture 24">
-            <a:extLst>
-              <a:ext uri="{FF2B5EF4-FFF2-40B4-BE49-F238E27FC236}">
-                <a16:creationId xmlns:a16="http://schemas.microsoft.com/office/drawing/2014/main" id="{C0306356-C727-8A4B-862F-785457A561EF}"/>
+          <p:cNvPr id="30" name="Picture 29">
+            <a:extLst>
+              <a:ext uri="{FF2B5EF4-FFF2-40B4-BE49-F238E27FC236}">
+                <a16:creationId xmlns:a16="http://schemas.microsoft.com/office/drawing/2014/main" id="{8D448A21-D185-0746-AEFF-2D64C121B895}"/>
               </a:ext>
             </a:extLst>
           </p:cNvPr>
@@ -3559,7 +3594,7 @@
         </p:blipFill>
         <p:spPr>
           <a:xfrm>
-            <a:off x="5053708" y="1074445"/>
+            <a:off x="7111108" y="3817645"/>
             <a:ext cx="2057400" cy="2743200"/>
           </a:xfrm>
           <a:prstGeom prst="rect">
@@ -3569,10 +3604,10 @@
       </p:pic>
       <p:pic>
         <p:nvPicPr>
-          <p:cNvPr id="27" name="Picture 26">
-            <a:extLst>
-              <a:ext uri="{FF2B5EF4-FFF2-40B4-BE49-F238E27FC236}">
-                <a16:creationId xmlns:a16="http://schemas.microsoft.com/office/drawing/2014/main" id="{B8BB642A-1103-4B48-B670-2E77AAC077C8}"/>
+          <p:cNvPr id="32" name="Picture 31">
+            <a:extLst>
+              <a:ext uri="{FF2B5EF4-FFF2-40B4-BE49-F238E27FC236}">
+                <a16:creationId xmlns:a16="http://schemas.microsoft.com/office/drawing/2014/main" id="{7B1B66AF-ED06-A845-BEB6-64A5676205A1}"/>
               </a:ext>
             </a:extLst>
           </p:cNvPr>
@@ -3589,7 +3624,7 @@
         </p:blipFill>
         <p:spPr>
           <a:xfrm>
-            <a:off x="7111108" y="3817645"/>
+            <a:off x="9168508" y="3817645"/>
             <a:ext cx="2057400" cy="2743200"/>
           </a:xfrm>
           <a:prstGeom prst="rect">
@@ -3597,71 +3632,6 @@
           </a:prstGeom>
         </p:spPr>
       </p:pic>
-      <p:pic>
-        <p:nvPicPr>
-          <p:cNvPr id="29" name="Picture 28">
-            <a:extLst>
-              <a:ext uri="{FF2B5EF4-FFF2-40B4-BE49-F238E27FC236}">
-                <a16:creationId xmlns:a16="http://schemas.microsoft.com/office/drawing/2014/main" id="{8B7EA3DB-578C-9641-9AD1-F2A1A7CB2A29}"/>
-              </a:ext>
-            </a:extLst>
-          </p:cNvPr>
-          <p:cNvPicPr>
-            <a:picLocks noChangeAspect="1"/>
-          </p:cNvPicPr>
-          <p:nvPr/>
-        </p:nvPicPr>
-        <p:blipFill>
-          <a:blip r:embed="rId11"/>
-          <a:stretch>
-            <a:fillRect/>
-          </a:stretch>
-        </p:blipFill>
-        <p:spPr>
-          <a:xfrm>
-            <a:off x="9168508" y="3817645"/>
-            <a:ext cx="2057400" cy="2743200"/>
-          </a:xfrm>
-          <a:prstGeom prst="rect">
-            <a:avLst/>
-          </a:prstGeom>
-        </p:spPr>
-      </p:pic>
-      <p:sp>
-        <p:nvSpPr>
-          <p:cNvPr id="2" name="TextBox 1">
-            <a:extLst>
-              <a:ext uri="{FF2B5EF4-FFF2-40B4-BE49-F238E27FC236}">
-                <a16:creationId xmlns:a16="http://schemas.microsoft.com/office/drawing/2014/main" id="{9A260BA1-7B40-BA43-9619-2D760D0F2637}"/>
-              </a:ext>
-            </a:extLst>
-          </p:cNvPr>
-          <p:cNvSpPr txBox="1"/>
-          <p:nvPr/>
-        </p:nvSpPr>
-        <p:spPr>
-          <a:xfrm>
-            <a:off x="0" y="0"/>
-            <a:ext cx="5097780" cy="369332"/>
-          </a:xfrm>
-          <a:prstGeom prst="rect">
-            <a:avLst/>
-          </a:prstGeom>
-          <a:noFill/>
-        </p:spPr>
-        <p:txBody>
-          <a:bodyPr wrap="square" rtlCol="0">
-            <a:spAutoFit/>
-          </a:bodyPr>
-          <a:lstStyle/>
-          <a:p>
-            <a:r>
-              <a:rPr lang="en-US" dirty="0"/>
-              <a:t>Attune</a:t>
-            </a:r>
-          </a:p>
-        </p:txBody>
-      </p:sp>
     </p:spTree>
     <p:extLst>
       <p:ext uri="{BB962C8B-B14F-4D97-AF65-F5344CB8AC3E}">
@@ -3729,10 +3699,10 @@
       </p:sp>
       <p:pic>
         <p:nvPicPr>
-          <p:cNvPr id="4" name="Picture 3">
-            <a:extLst>
-              <a:ext uri="{FF2B5EF4-FFF2-40B4-BE49-F238E27FC236}">
-                <a16:creationId xmlns:a16="http://schemas.microsoft.com/office/drawing/2014/main" id="{84555EF8-BA83-574C-AE35-7C693C649D33}"/>
+          <p:cNvPr id="5" name="Picture 4">
+            <a:extLst>
+              <a:ext uri="{FF2B5EF4-FFF2-40B4-BE49-F238E27FC236}">
+                <a16:creationId xmlns:a16="http://schemas.microsoft.com/office/drawing/2014/main" id="{02A92CF4-53DD-3C42-AC92-E021D13CDE6E}"/>
               </a:ext>
             </a:extLst>
           </p:cNvPr>
@@ -3759,10 +3729,10 @@
       </p:pic>
       <p:pic>
         <p:nvPicPr>
-          <p:cNvPr id="6" name="Picture 5">
-            <a:extLst>
-              <a:ext uri="{FF2B5EF4-FFF2-40B4-BE49-F238E27FC236}">
-                <a16:creationId xmlns:a16="http://schemas.microsoft.com/office/drawing/2014/main" id="{F9E6716A-4198-084B-8427-AC1BE926187C}"/>
+          <p:cNvPr id="8" name="Picture 7">
+            <a:extLst>
+              <a:ext uri="{FF2B5EF4-FFF2-40B4-BE49-F238E27FC236}">
+                <a16:creationId xmlns:a16="http://schemas.microsoft.com/office/drawing/2014/main" id="{A3DD1FA7-30C6-B84B-A583-94DFF0A90379}"/>
               </a:ext>
             </a:extLst>
           </p:cNvPr>
@@ -3789,10 +3759,10 @@
       </p:pic>
       <p:pic>
         <p:nvPicPr>
-          <p:cNvPr id="10" name="Picture 9">
-            <a:extLst>
-              <a:ext uri="{FF2B5EF4-FFF2-40B4-BE49-F238E27FC236}">
-                <a16:creationId xmlns:a16="http://schemas.microsoft.com/office/drawing/2014/main" id="{125914ED-36A2-5940-876B-B1AA04B81403}"/>
+          <p:cNvPr id="11" name="Picture 10">
+            <a:extLst>
+              <a:ext uri="{FF2B5EF4-FFF2-40B4-BE49-F238E27FC236}">
+                <a16:creationId xmlns:a16="http://schemas.microsoft.com/office/drawing/2014/main" id="{DEC2DDD2-E3A4-DB43-9BB7-AC49ED179B68}"/>
               </a:ext>
             </a:extLst>
           </p:cNvPr>
@@ -3809,7 +3779,7 @@
         </p:blipFill>
         <p:spPr>
           <a:xfrm>
-            <a:off x="5053708" y="1074445"/>
+            <a:off x="4998153" y="1074445"/>
             <a:ext cx="2057400" cy="2743200"/>
           </a:xfrm>
           <a:prstGeom prst="rect">
@@ -3819,10 +3789,10 @@
       </p:pic>
       <p:pic>
         <p:nvPicPr>
-          <p:cNvPr id="13" name="Picture 12">
-            <a:extLst>
-              <a:ext uri="{FF2B5EF4-FFF2-40B4-BE49-F238E27FC236}">
-                <a16:creationId xmlns:a16="http://schemas.microsoft.com/office/drawing/2014/main" id="{075A9422-E980-4C4C-8E71-42B59A3106B5}"/>
+          <p:cNvPr id="14" name="Picture 13">
+            <a:extLst>
+              <a:ext uri="{FF2B5EF4-FFF2-40B4-BE49-F238E27FC236}">
+                <a16:creationId xmlns:a16="http://schemas.microsoft.com/office/drawing/2014/main" id="{F16101AF-9A37-4946-BFE5-13E92C0D9DB5}"/>
               </a:ext>
             </a:extLst>
           </p:cNvPr>
@@ -3839,7 +3809,7 @@
         </p:blipFill>
         <p:spPr>
           <a:xfrm>
-            <a:off x="7111108" y="1074445"/>
+            <a:off x="7000104" y="1074445"/>
             <a:ext cx="2057400" cy="2743200"/>
           </a:xfrm>
           <a:prstGeom prst="rect">
@@ -3849,10 +3819,10 @@
       </p:pic>
       <p:pic>
         <p:nvPicPr>
-          <p:cNvPr id="16" name="Picture 15">
-            <a:extLst>
-              <a:ext uri="{FF2B5EF4-FFF2-40B4-BE49-F238E27FC236}">
-                <a16:creationId xmlns:a16="http://schemas.microsoft.com/office/drawing/2014/main" id="{5C495E96-4D8B-194D-B05F-584A977AEC2A}"/>
+          <p:cNvPr id="17" name="Picture 16">
+            <a:extLst>
+              <a:ext uri="{FF2B5EF4-FFF2-40B4-BE49-F238E27FC236}">
+                <a16:creationId xmlns:a16="http://schemas.microsoft.com/office/drawing/2014/main" id="{58507D6D-387B-B649-BA88-AA726FCC9343}"/>
               </a:ext>
             </a:extLst>
           </p:cNvPr>
@@ -3869,7 +3839,7 @@
         </p:blipFill>
         <p:spPr>
           <a:xfrm>
-            <a:off x="883406" y="3817645"/>
+            <a:off x="938802" y="3817645"/>
             <a:ext cx="2057400" cy="2743200"/>
           </a:xfrm>
           <a:prstGeom prst="rect">
@@ -3879,10 +3849,10 @@
       </p:pic>
       <p:pic>
         <p:nvPicPr>
-          <p:cNvPr id="19" name="Picture 18">
-            <a:extLst>
-              <a:ext uri="{FF2B5EF4-FFF2-40B4-BE49-F238E27FC236}">
-                <a16:creationId xmlns:a16="http://schemas.microsoft.com/office/drawing/2014/main" id="{A22CD729-6AF2-0D40-A9B8-360C37E7473B}"/>
+          <p:cNvPr id="20" name="Picture 19">
+            <a:extLst>
+              <a:ext uri="{FF2B5EF4-FFF2-40B4-BE49-F238E27FC236}">
+                <a16:creationId xmlns:a16="http://schemas.microsoft.com/office/drawing/2014/main" id="{834D61CF-A3AD-124B-BF36-809FF570FD14}"/>
               </a:ext>
             </a:extLst>
           </p:cNvPr>
@@ -3899,7 +3869,7 @@
         </p:blipFill>
         <p:spPr>
           <a:xfrm>
-            <a:off x="9113006" y="1074445"/>
+            <a:off x="2996202" y="3817645"/>
             <a:ext cx="2057400" cy="2743200"/>
           </a:xfrm>
           <a:prstGeom prst="rect">
@@ -3909,10 +3879,10 @@
       </p:pic>
       <p:pic>
         <p:nvPicPr>
-          <p:cNvPr id="22" name="Picture 21">
-            <a:extLst>
-              <a:ext uri="{FF2B5EF4-FFF2-40B4-BE49-F238E27FC236}">
-                <a16:creationId xmlns:a16="http://schemas.microsoft.com/office/drawing/2014/main" id="{A97E657C-1A85-C946-B7C1-1ABF073952E2}"/>
+          <p:cNvPr id="23" name="Picture 22">
+            <a:extLst>
+              <a:ext uri="{FF2B5EF4-FFF2-40B4-BE49-F238E27FC236}">
+                <a16:creationId xmlns:a16="http://schemas.microsoft.com/office/drawing/2014/main" id="{636A5EB4-6008-B940-8C03-85F54E788D66}"/>
               </a:ext>
             </a:extLst>
           </p:cNvPr>
@@ -3929,7 +3899,7 @@
         </p:blipFill>
         <p:spPr>
           <a:xfrm>
-            <a:off x="2996308" y="3817645"/>
+            <a:off x="4998047" y="3817645"/>
             <a:ext cx="2057400" cy="2743200"/>
           </a:xfrm>
           <a:prstGeom prst="rect">
@@ -3939,10 +3909,10 @@
       </p:pic>
       <p:pic>
         <p:nvPicPr>
-          <p:cNvPr id="26" name="Picture 25">
-            <a:extLst>
-              <a:ext uri="{FF2B5EF4-FFF2-40B4-BE49-F238E27FC236}">
-                <a16:creationId xmlns:a16="http://schemas.microsoft.com/office/drawing/2014/main" id="{94F18CE4-762F-7C4A-8DB2-6B152BB8A987}"/>
+          <p:cNvPr id="25" name="Picture 24">
+            <a:extLst>
+              <a:ext uri="{FF2B5EF4-FFF2-40B4-BE49-F238E27FC236}">
+                <a16:creationId xmlns:a16="http://schemas.microsoft.com/office/drawing/2014/main" id="{FFE74CAD-9CE2-9046-ACD6-B46D0626D6B4}"/>
               </a:ext>
             </a:extLst>
           </p:cNvPr>
@@ -3959,7 +3929,7 @@
         </p:blipFill>
         <p:spPr>
           <a:xfrm>
-            <a:off x="5053708" y="3817645"/>
+            <a:off x="7000104" y="3817645"/>
             <a:ext cx="2057400" cy="2743200"/>
           </a:xfrm>
           <a:prstGeom prst="rect">
@@ -3969,10 +3939,10 @@
       </p:pic>
       <p:pic>
         <p:nvPicPr>
-          <p:cNvPr id="30" name="Picture 29">
-            <a:extLst>
-              <a:ext uri="{FF2B5EF4-FFF2-40B4-BE49-F238E27FC236}">
-                <a16:creationId xmlns:a16="http://schemas.microsoft.com/office/drawing/2014/main" id="{D43D6FB8-E33C-9749-87FD-8940CE00CC16}"/>
+          <p:cNvPr id="28" name="Picture 27">
+            <a:extLst>
+              <a:ext uri="{FF2B5EF4-FFF2-40B4-BE49-F238E27FC236}">
+                <a16:creationId xmlns:a16="http://schemas.microsoft.com/office/drawing/2014/main" id="{1A93B226-A288-374A-BECE-048AC0A29FF4}"/>
               </a:ext>
             </a:extLst>
           </p:cNvPr>
@@ -3989,37 +3959,7 @@
         </p:blipFill>
         <p:spPr>
           <a:xfrm>
-            <a:off x="7111108" y="3817645"/>
-            <a:ext cx="2057400" cy="2743200"/>
-          </a:xfrm>
-          <a:prstGeom prst="rect">
-            <a:avLst/>
-          </a:prstGeom>
-        </p:spPr>
-      </p:pic>
-      <p:pic>
-        <p:nvPicPr>
-          <p:cNvPr id="32" name="Picture 31">
-            <a:extLst>
-              <a:ext uri="{FF2B5EF4-FFF2-40B4-BE49-F238E27FC236}">
-                <a16:creationId xmlns:a16="http://schemas.microsoft.com/office/drawing/2014/main" id="{CB725B8B-BBCF-0E46-8314-270A993EB102}"/>
-              </a:ext>
-            </a:extLst>
-          </p:cNvPr>
-          <p:cNvPicPr>
-            <a:picLocks noChangeAspect="1"/>
-          </p:cNvPicPr>
-          <p:nvPr/>
-        </p:nvPicPr>
-        <p:blipFill>
-          <a:blip r:embed="rId11"/>
-          <a:stretch>
-            <a:fillRect/>
-          </a:stretch>
-        </p:blipFill>
-        <p:spPr>
-          <a:xfrm>
-            <a:off x="9113006" y="3817645"/>
+            <a:off x="9057186" y="3817645"/>
             <a:ext cx="2057400" cy="2743200"/>
           </a:xfrm>
           <a:prstGeom prst="rect">

</xml_diff>

<commit_message>
12/3/20 Added Aria and Aria-SORP
</commit_message>
<xml_diff>
--- a/CWRU_Flow_FPs.pptx
+++ b/CWRU_Flow_FPs.pptx
@@ -7,6 +7,8 @@
   <p:sldIdLst>
     <p:sldId id="256" r:id="rId2"/>
     <p:sldId id="257" r:id="rId3"/>
+    <p:sldId id="258" r:id="rId4"/>
+    <p:sldId id="259" r:id="rId5"/>
   </p:sldIdLst>
   <p:sldSz cx="12192000" cy="6858000"/>
   <p:notesSz cx="6858000" cy="9144000"/>
@@ -260,7 +262,7 @@
           <a:p>
             <a:fld id="{75DC174B-3D36-5849-A443-D58DC242DE4F}" type="datetimeFigureOut">
               <a:rPr lang="en-US" smtClean="0"/>
-              <a:t>8/11/20</a:t>
+              <a:t>12/3/20</a:t>
             </a:fld>
             <a:endParaRPr lang="en-US"/>
           </a:p>
@@ -458,7 +460,7 @@
           <a:p>
             <a:fld id="{75DC174B-3D36-5849-A443-D58DC242DE4F}" type="datetimeFigureOut">
               <a:rPr lang="en-US" smtClean="0"/>
-              <a:t>8/11/20</a:t>
+              <a:t>12/3/20</a:t>
             </a:fld>
             <a:endParaRPr lang="en-US"/>
           </a:p>
@@ -666,7 +668,7 @@
           <a:p>
             <a:fld id="{75DC174B-3D36-5849-A443-D58DC242DE4F}" type="datetimeFigureOut">
               <a:rPr lang="en-US" smtClean="0"/>
-              <a:t>8/11/20</a:t>
+              <a:t>12/3/20</a:t>
             </a:fld>
             <a:endParaRPr lang="en-US"/>
           </a:p>
@@ -864,7 +866,7 @@
           <a:p>
             <a:fld id="{75DC174B-3D36-5849-A443-D58DC242DE4F}" type="datetimeFigureOut">
               <a:rPr lang="en-US" smtClean="0"/>
-              <a:t>8/11/20</a:t>
+              <a:t>12/3/20</a:t>
             </a:fld>
             <a:endParaRPr lang="en-US"/>
           </a:p>
@@ -1139,7 +1141,7 @@
           <a:p>
             <a:fld id="{75DC174B-3D36-5849-A443-D58DC242DE4F}" type="datetimeFigureOut">
               <a:rPr lang="en-US" smtClean="0"/>
-              <a:t>8/11/20</a:t>
+              <a:t>12/3/20</a:t>
             </a:fld>
             <a:endParaRPr lang="en-US"/>
           </a:p>
@@ -1404,7 +1406,7 @@
           <a:p>
             <a:fld id="{75DC174B-3D36-5849-A443-D58DC242DE4F}" type="datetimeFigureOut">
               <a:rPr lang="en-US" smtClean="0"/>
-              <a:t>8/11/20</a:t>
+              <a:t>12/3/20</a:t>
             </a:fld>
             <a:endParaRPr lang="en-US"/>
           </a:p>
@@ -1816,7 +1818,7 @@
           <a:p>
             <a:fld id="{75DC174B-3D36-5849-A443-D58DC242DE4F}" type="datetimeFigureOut">
               <a:rPr lang="en-US" smtClean="0"/>
-              <a:t>8/11/20</a:t>
+              <a:t>12/3/20</a:t>
             </a:fld>
             <a:endParaRPr lang="en-US"/>
           </a:p>
@@ -1957,7 +1959,7 @@
           <a:p>
             <a:fld id="{75DC174B-3D36-5849-A443-D58DC242DE4F}" type="datetimeFigureOut">
               <a:rPr lang="en-US" smtClean="0"/>
-              <a:t>8/11/20</a:t>
+              <a:t>12/3/20</a:t>
             </a:fld>
             <a:endParaRPr lang="en-US"/>
           </a:p>
@@ -2070,7 +2072,7 @@
           <a:p>
             <a:fld id="{75DC174B-3D36-5849-A443-D58DC242DE4F}" type="datetimeFigureOut">
               <a:rPr lang="en-US" smtClean="0"/>
-              <a:t>8/11/20</a:t>
+              <a:t>12/3/20</a:t>
             </a:fld>
             <a:endParaRPr lang="en-US"/>
           </a:p>
@@ -2381,7 +2383,7 @@
           <a:p>
             <a:fld id="{75DC174B-3D36-5849-A443-D58DC242DE4F}" type="datetimeFigureOut">
               <a:rPr lang="en-US" smtClean="0"/>
-              <a:t>8/11/20</a:t>
+              <a:t>12/3/20</a:t>
             </a:fld>
             <a:endParaRPr lang="en-US"/>
           </a:p>
@@ -2669,7 +2671,7 @@
           <a:p>
             <a:fld id="{75DC174B-3D36-5849-A443-D58DC242DE4F}" type="datetimeFigureOut">
               <a:rPr lang="en-US" smtClean="0"/>
-              <a:t>8/11/20</a:t>
+              <a:t>12/3/20</a:t>
             </a:fld>
             <a:endParaRPr lang="en-US"/>
           </a:p>
@@ -2910,7 +2912,7 @@
           <a:p>
             <a:fld id="{75DC174B-3D36-5849-A443-D58DC242DE4F}" type="datetimeFigureOut">
               <a:rPr lang="en-US" smtClean="0"/>
-              <a:t>8/11/20</a:t>
+              <a:t>12/3/20</a:t>
             </a:fld>
             <a:endParaRPr lang="en-US"/>
           </a:p>
@@ -3327,47 +3329,12 @@
           <a:chExt cx="0" cy="0"/>
         </a:xfrm>
       </p:grpSpPr>
-      <p:sp>
-        <p:nvSpPr>
-          <p:cNvPr id="2" name="TextBox 1">
-            <a:extLst>
-              <a:ext uri="{FF2B5EF4-FFF2-40B4-BE49-F238E27FC236}">
-                <a16:creationId xmlns:a16="http://schemas.microsoft.com/office/drawing/2014/main" id="{9A260BA1-7B40-BA43-9619-2D760D0F2637}"/>
-              </a:ext>
-            </a:extLst>
-          </p:cNvPr>
-          <p:cNvSpPr txBox="1"/>
-          <p:nvPr/>
-        </p:nvSpPr>
-        <p:spPr>
-          <a:xfrm>
-            <a:off x="0" y="0"/>
-            <a:ext cx="5097780" cy="369332"/>
-          </a:xfrm>
-          <a:prstGeom prst="rect">
-            <a:avLst/>
-          </a:prstGeom>
-          <a:noFill/>
-        </p:spPr>
-        <p:txBody>
-          <a:bodyPr wrap="square" rtlCol="0">
-            <a:spAutoFit/>
-          </a:bodyPr>
-          <a:lstStyle/>
-          <a:p>
-            <a:r>
-              <a:rPr lang="en-US" dirty="0"/>
-              <a:t>Attune</a:t>
-            </a:r>
-          </a:p>
-        </p:txBody>
-      </p:sp>
       <p:pic>
         <p:nvPicPr>
-          <p:cNvPr id="4" name="Picture 3">
-            <a:extLst>
-              <a:ext uri="{FF2B5EF4-FFF2-40B4-BE49-F238E27FC236}">
-                <a16:creationId xmlns:a16="http://schemas.microsoft.com/office/drawing/2014/main" id="{D1837CE7-4C98-DB4E-8692-D69BF2BBDEC8}"/>
+          <p:cNvPr id="17" name="Picture 16">
+            <a:extLst>
+              <a:ext uri="{FF2B5EF4-FFF2-40B4-BE49-F238E27FC236}">
+                <a16:creationId xmlns:a16="http://schemas.microsoft.com/office/drawing/2014/main" id="{58FC7595-95DB-FE4A-91FB-74412D72E72E}"/>
               </a:ext>
             </a:extLst>
           </p:cNvPr>
@@ -3384,7 +3351,7 @@
         </p:blipFill>
         <p:spPr>
           <a:xfrm>
-            <a:off x="938908" y="1074445"/>
+            <a:off x="938908" y="3817645"/>
             <a:ext cx="2057400" cy="2743200"/>
           </a:xfrm>
           <a:prstGeom prst="rect">
@@ -3394,10 +3361,10 @@
       </p:pic>
       <p:pic>
         <p:nvPicPr>
-          <p:cNvPr id="6" name="Picture 5">
-            <a:extLst>
-              <a:ext uri="{FF2B5EF4-FFF2-40B4-BE49-F238E27FC236}">
-                <a16:creationId xmlns:a16="http://schemas.microsoft.com/office/drawing/2014/main" id="{DB44A84F-761C-C84F-9249-BB6BA1D06C55}"/>
+          <p:cNvPr id="20" name="Picture 19">
+            <a:extLst>
+              <a:ext uri="{FF2B5EF4-FFF2-40B4-BE49-F238E27FC236}">
+                <a16:creationId xmlns:a16="http://schemas.microsoft.com/office/drawing/2014/main" id="{4E781655-540D-6543-BFDC-F333DF15C57E}"/>
               </a:ext>
             </a:extLst>
           </p:cNvPr>
@@ -3414,7 +3381,7 @@
         </p:blipFill>
         <p:spPr>
           <a:xfrm>
-            <a:off x="2996308" y="1074445"/>
+            <a:off x="2996308" y="3817645"/>
             <a:ext cx="2057400" cy="2743200"/>
           </a:xfrm>
           <a:prstGeom prst="rect">
@@ -3424,10 +3391,10 @@
       </p:pic>
       <p:pic>
         <p:nvPicPr>
-          <p:cNvPr id="10" name="Picture 9">
-            <a:extLst>
-              <a:ext uri="{FF2B5EF4-FFF2-40B4-BE49-F238E27FC236}">
-                <a16:creationId xmlns:a16="http://schemas.microsoft.com/office/drawing/2014/main" id="{B4D4FCAC-86B8-4540-93E3-DD12B75E8FFC}"/>
+          <p:cNvPr id="22" name="Picture 21">
+            <a:extLst>
+              <a:ext uri="{FF2B5EF4-FFF2-40B4-BE49-F238E27FC236}">
+                <a16:creationId xmlns:a16="http://schemas.microsoft.com/office/drawing/2014/main" id="{6F8F77B1-1DF7-BB4A-B404-C4A06B3FC2AA}"/>
               </a:ext>
             </a:extLst>
           </p:cNvPr>
@@ -3444,7 +3411,7 @@
         </p:blipFill>
         <p:spPr>
           <a:xfrm>
-            <a:off x="5053708" y="1074445"/>
+            <a:off x="5053708" y="3817645"/>
             <a:ext cx="2057400" cy="2743200"/>
           </a:xfrm>
           <a:prstGeom prst="rect">
@@ -3454,10 +3421,10 @@
       </p:pic>
       <p:pic>
         <p:nvPicPr>
-          <p:cNvPr id="13" name="Picture 12">
-            <a:extLst>
-              <a:ext uri="{FF2B5EF4-FFF2-40B4-BE49-F238E27FC236}">
-                <a16:creationId xmlns:a16="http://schemas.microsoft.com/office/drawing/2014/main" id="{F23A16A0-3A0B-4846-9A5B-05C48864C80A}"/>
+          <p:cNvPr id="24" name="Picture 23">
+            <a:extLst>
+              <a:ext uri="{FF2B5EF4-FFF2-40B4-BE49-F238E27FC236}">
+                <a16:creationId xmlns:a16="http://schemas.microsoft.com/office/drawing/2014/main" id="{36BF9E08-87B7-2A45-B518-4591A7AB25DB}"/>
               </a:ext>
             </a:extLst>
           </p:cNvPr>
@@ -3474,7 +3441,7 @@
         </p:blipFill>
         <p:spPr>
           <a:xfrm>
-            <a:off x="7111108" y="1074445"/>
+            <a:off x="7111108" y="3817645"/>
             <a:ext cx="2057400" cy="2743200"/>
           </a:xfrm>
           <a:prstGeom prst="rect">
@@ -3484,10 +3451,10 @@
       </p:pic>
       <p:pic>
         <p:nvPicPr>
-          <p:cNvPr id="16" name="Picture 15">
-            <a:extLst>
-              <a:ext uri="{FF2B5EF4-FFF2-40B4-BE49-F238E27FC236}">
-                <a16:creationId xmlns:a16="http://schemas.microsoft.com/office/drawing/2014/main" id="{080CE52A-7D64-0046-B9AA-7EC7263273C9}"/>
+          <p:cNvPr id="27" name="Picture 26">
+            <a:extLst>
+              <a:ext uri="{FF2B5EF4-FFF2-40B4-BE49-F238E27FC236}">
+                <a16:creationId xmlns:a16="http://schemas.microsoft.com/office/drawing/2014/main" id="{EA99EB38-9CB4-964F-BD64-D842C2A1FD7E}"/>
               </a:ext>
             </a:extLst>
           </p:cNvPr>
@@ -3504,7 +3471,7 @@
         </p:blipFill>
         <p:spPr>
           <a:xfrm>
-            <a:off x="938908" y="3817645"/>
+            <a:off x="9168508" y="3817645"/>
             <a:ext cx="2057400" cy="2743200"/>
           </a:xfrm>
           <a:prstGeom prst="rect">
@@ -3514,10 +3481,10 @@
       </p:pic>
       <p:pic>
         <p:nvPicPr>
-          <p:cNvPr id="19" name="Picture 18">
-            <a:extLst>
-              <a:ext uri="{FF2B5EF4-FFF2-40B4-BE49-F238E27FC236}">
-                <a16:creationId xmlns:a16="http://schemas.microsoft.com/office/drawing/2014/main" id="{8892516A-BDB8-B541-AEFA-E5DC2D03AA62}"/>
+          <p:cNvPr id="14" name="Picture 13">
+            <a:extLst>
+              <a:ext uri="{FF2B5EF4-FFF2-40B4-BE49-F238E27FC236}">
+                <a16:creationId xmlns:a16="http://schemas.microsoft.com/office/drawing/2014/main" id="{7D7DB064-DB2F-5449-A4F6-6FDAE7ADE7C3}"/>
               </a:ext>
             </a:extLst>
           </p:cNvPr>
@@ -3534,7 +3501,7 @@
         </p:blipFill>
         <p:spPr>
           <a:xfrm>
-            <a:off x="2996308" y="3817645"/>
+            <a:off x="7111108" y="1074445"/>
             <a:ext cx="2057400" cy="2743200"/>
           </a:xfrm>
           <a:prstGeom prst="rect">
@@ -3544,10 +3511,10 @@
       </p:pic>
       <p:pic>
         <p:nvPicPr>
-          <p:cNvPr id="26" name="Picture 25">
-            <a:extLst>
-              <a:ext uri="{FF2B5EF4-FFF2-40B4-BE49-F238E27FC236}">
-                <a16:creationId xmlns:a16="http://schemas.microsoft.com/office/drawing/2014/main" id="{16DCEBF7-FD3D-B843-B3B5-D599EF116EB5}"/>
+          <p:cNvPr id="11" name="Picture 10">
+            <a:extLst>
+              <a:ext uri="{FF2B5EF4-FFF2-40B4-BE49-F238E27FC236}">
+                <a16:creationId xmlns:a16="http://schemas.microsoft.com/office/drawing/2014/main" id="{B170E70C-0DC4-5245-B486-AA707FDBEB32}"/>
               </a:ext>
             </a:extLst>
           </p:cNvPr>
@@ -3564,7 +3531,7 @@
         </p:blipFill>
         <p:spPr>
           <a:xfrm>
-            <a:off x="5053708" y="3817645"/>
+            <a:off x="5053708" y="1074445"/>
             <a:ext cx="2057400" cy="2743200"/>
           </a:xfrm>
           <a:prstGeom prst="rect">
@@ -3574,10 +3541,10 @@
       </p:pic>
       <p:pic>
         <p:nvPicPr>
-          <p:cNvPr id="30" name="Picture 29">
-            <a:extLst>
-              <a:ext uri="{FF2B5EF4-FFF2-40B4-BE49-F238E27FC236}">
-                <a16:creationId xmlns:a16="http://schemas.microsoft.com/office/drawing/2014/main" id="{8D448A21-D185-0746-AEFF-2D64C121B895}"/>
+          <p:cNvPr id="8" name="Picture 7">
+            <a:extLst>
+              <a:ext uri="{FF2B5EF4-FFF2-40B4-BE49-F238E27FC236}">
+                <a16:creationId xmlns:a16="http://schemas.microsoft.com/office/drawing/2014/main" id="{7BFBFF61-842C-614E-9820-D01D862FA203}"/>
               </a:ext>
             </a:extLst>
           </p:cNvPr>
@@ -3594,7 +3561,7 @@
         </p:blipFill>
         <p:spPr>
           <a:xfrm>
-            <a:off x="7111108" y="3817645"/>
+            <a:off x="2996308" y="1074445"/>
             <a:ext cx="2057400" cy="2743200"/>
           </a:xfrm>
           <a:prstGeom prst="rect">
@@ -3604,10 +3571,10 @@
       </p:pic>
       <p:pic>
         <p:nvPicPr>
-          <p:cNvPr id="32" name="Picture 31">
-            <a:extLst>
-              <a:ext uri="{FF2B5EF4-FFF2-40B4-BE49-F238E27FC236}">
-                <a16:creationId xmlns:a16="http://schemas.microsoft.com/office/drawing/2014/main" id="{7B1B66AF-ED06-A845-BEB6-64A5676205A1}"/>
+          <p:cNvPr id="5" name="Picture 4">
+            <a:extLst>
+              <a:ext uri="{FF2B5EF4-FFF2-40B4-BE49-F238E27FC236}">
+                <a16:creationId xmlns:a16="http://schemas.microsoft.com/office/drawing/2014/main" id="{7EC1C1FD-2AA0-D54D-9E79-5126B3F85C04}"/>
               </a:ext>
             </a:extLst>
           </p:cNvPr>
@@ -3624,7 +3591,7 @@
         </p:blipFill>
         <p:spPr>
           <a:xfrm>
-            <a:off x="9168508" y="3817645"/>
+            <a:off x="938908" y="1074445"/>
             <a:ext cx="2057400" cy="2743200"/>
           </a:xfrm>
           <a:prstGeom prst="rect">
@@ -3632,6 +3599,41 @@
           </a:prstGeom>
         </p:spPr>
       </p:pic>
+      <p:sp>
+        <p:nvSpPr>
+          <p:cNvPr id="2" name="TextBox 1">
+            <a:extLst>
+              <a:ext uri="{FF2B5EF4-FFF2-40B4-BE49-F238E27FC236}">
+                <a16:creationId xmlns:a16="http://schemas.microsoft.com/office/drawing/2014/main" id="{9A260BA1-7B40-BA43-9619-2D760D0F2637}"/>
+              </a:ext>
+            </a:extLst>
+          </p:cNvPr>
+          <p:cNvSpPr txBox="1"/>
+          <p:nvPr/>
+        </p:nvSpPr>
+        <p:spPr>
+          <a:xfrm>
+            <a:off x="0" y="0"/>
+            <a:ext cx="5097780" cy="369332"/>
+          </a:xfrm>
+          <a:prstGeom prst="rect">
+            <a:avLst/>
+          </a:prstGeom>
+          <a:noFill/>
+        </p:spPr>
+        <p:txBody>
+          <a:bodyPr wrap="square" rtlCol="0">
+            <a:spAutoFit/>
+          </a:bodyPr>
+          <a:lstStyle/>
+          <a:p>
+            <a:r>
+              <a:rPr lang="en-US" dirty="0"/>
+              <a:t>Attune</a:t>
+            </a:r>
+          </a:p>
+        </p:txBody>
+      </p:sp>
     </p:spTree>
     <p:extLst>
       <p:ext uri="{BB962C8B-B14F-4D97-AF65-F5344CB8AC3E}">
@@ -3662,47 +3664,12 @@
           <a:chExt cx="0" cy="0"/>
         </a:xfrm>
       </p:grpSpPr>
-      <p:sp>
-        <p:nvSpPr>
-          <p:cNvPr id="2" name="TextBox 1">
-            <a:extLst>
-              <a:ext uri="{FF2B5EF4-FFF2-40B4-BE49-F238E27FC236}">
-                <a16:creationId xmlns:a16="http://schemas.microsoft.com/office/drawing/2014/main" id="{9A260BA1-7B40-BA43-9619-2D760D0F2637}"/>
-              </a:ext>
-            </a:extLst>
-          </p:cNvPr>
-          <p:cNvSpPr txBox="1"/>
-          <p:nvPr/>
-        </p:nvSpPr>
-        <p:spPr>
-          <a:xfrm>
-            <a:off x="0" y="0"/>
-            <a:ext cx="5097780" cy="369332"/>
-          </a:xfrm>
-          <a:prstGeom prst="rect">
-            <a:avLst/>
-          </a:prstGeom>
-          <a:noFill/>
-        </p:spPr>
-        <p:txBody>
-          <a:bodyPr wrap="square" rtlCol="0">
-            <a:spAutoFit/>
-          </a:bodyPr>
-          <a:lstStyle/>
-          <a:p>
-            <a:r>
-              <a:rPr lang="en-US" dirty="0"/>
-              <a:t>LSR2</a:t>
-            </a:r>
-          </a:p>
-        </p:txBody>
-      </p:sp>
       <p:pic>
         <p:nvPicPr>
-          <p:cNvPr id="5" name="Picture 4">
-            <a:extLst>
-              <a:ext uri="{FF2B5EF4-FFF2-40B4-BE49-F238E27FC236}">
-                <a16:creationId xmlns:a16="http://schemas.microsoft.com/office/drawing/2014/main" id="{02A92CF4-53DD-3C42-AC92-E021D13CDE6E}"/>
+          <p:cNvPr id="4" name="Picture 3">
+            <a:extLst>
+              <a:ext uri="{FF2B5EF4-FFF2-40B4-BE49-F238E27FC236}">
+                <a16:creationId xmlns:a16="http://schemas.microsoft.com/office/drawing/2014/main" id="{EA4F0D1F-8313-B045-BF52-EDB937C9DFC5}"/>
               </a:ext>
             </a:extLst>
           </p:cNvPr>
@@ -3719,7 +3686,7 @@
         </p:blipFill>
         <p:spPr>
           <a:xfrm>
-            <a:off x="938908" y="1074445"/>
+            <a:off x="883300" y="1074445"/>
             <a:ext cx="2057400" cy="2743200"/>
           </a:xfrm>
           <a:prstGeom prst="rect">
@@ -3729,10 +3696,10 @@
       </p:pic>
       <p:pic>
         <p:nvPicPr>
-          <p:cNvPr id="8" name="Picture 7">
-            <a:extLst>
-              <a:ext uri="{FF2B5EF4-FFF2-40B4-BE49-F238E27FC236}">
-                <a16:creationId xmlns:a16="http://schemas.microsoft.com/office/drawing/2014/main" id="{A3DD1FA7-30C6-B84B-A583-94DFF0A90379}"/>
+          <p:cNvPr id="7" name="Picture 6">
+            <a:extLst>
+              <a:ext uri="{FF2B5EF4-FFF2-40B4-BE49-F238E27FC236}">
+                <a16:creationId xmlns:a16="http://schemas.microsoft.com/office/drawing/2014/main" id="{5CA65593-354E-3C4E-AA84-0512598B1E32}"/>
               </a:ext>
             </a:extLst>
           </p:cNvPr>
@@ -3749,7 +3716,7 @@
         </p:blipFill>
         <p:spPr>
           <a:xfrm>
-            <a:off x="2996308" y="1074445"/>
+            <a:off x="2968319" y="1074445"/>
             <a:ext cx="2057400" cy="2743200"/>
           </a:xfrm>
           <a:prstGeom prst="rect">
@@ -3759,10 +3726,10 @@
       </p:pic>
       <p:pic>
         <p:nvPicPr>
-          <p:cNvPr id="11" name="Picture 10">
-            <a:extLst>
-              <a:ext uri="{FF2B5EF4-FFF2-40B4-BE49-F238E27FC236}">
-                <a16:creationId xmlns:a16="http://schemas.microsoft.com/office/drawing/2014/main" id="{DEC2DDD2-E3A4-DB43-9BB7-AC49ED179B68}"/>
+          <p:cNvPr id="10" name="Picture 9">
+            <a:extLst>
+              <a:ext uri="{FF2B5EF4-FFF2-40B4-BE49-F238E27FC236}">
+                <a16:creationId xmlns:a16="http://schemas.microsoft.com/office/drawing/2014/main" id="{3C1CEACA-859D-994F-BB83-A68A24D5DB72}"/>
               </a:ext>
             </a:extLst>
           </p:cNvPr>
@@ -3779,7 +3746,7 @@
         </p:blipFill>
         <p:spPr>
           <a:xfrm>
-            <a:off x="4998153" y="1074445"/>
+            <a:off x="4942651" y="1074445"/>
             <a:ext cx="2057400" cy="2743200"/>
           </a:xfrm>
           <a:prstGeom prst="rect">
@@ -3789,10 +3756,10 @@
       </p:pic>
       <p:pic>
         <p:nvPicPr>
-          <p:cNvPr id="14" name="Picture 13">
-            <a:extLst>
-              <a:ext uri="{FF2B5EF4-FFF2-40B4-BE49-F238E27FC236}">
-                <a16:creationId xmlns:a16="http://schemas.microsoft.com/office/drawing/2014/main" id="{F16101AF-9A37-4946-BFE5-13E92C0D9DB5}"/>
+          <p:cNvPr id="13" name="Picture 12">
+            <a:extLst>
+              <a:ext uri="{FF2B5EF4-FFF2-40B4-BE49-F238E27FC236}">
+                <a16:creationId xmlns:a16="http://schemas.microsoft.com/office/drawing/2014/main" id="{21BB6063-5CC4-7941-9BC1-09BB86CE082C}"/>
               </a:ext>
             </a:extLst>
           </p:cNvPr>
@@ -3809,7 +3776,7 @@
         </p:blipFill>
         <p:spPr>
           <a:xfrm>
-            <a:off x="7000104" y="1074445"/>
+            <a:off x="6944284" y="1074445"/>
             <a:ext cx="2057400" cy="2743200"/>
           </a:xfrm>
           <a:prstGeom prst="rect">
@@ -3819,10 +3786,10 @@
       </p:pic>
       <p:pic>
         <p:nvPicPr>
-          <p:cNvPr id="17" name="Picture 16">
-            <a:extLst>
-              <a:ext uri="{FF2B5EF4-FFF2-40B4-BE49-F238E27FC236}">
-                <a16:creationId xmlns:a16="http://schemas.microsoft.com/office/drawing/2014/main" id="{58507D6D-387B-B649-BA88-AA726FCC9343}"/>
+          <p:cNvPr id="16" name="Picture 15">
+            <a:extLst>
+              <a:ext uri="{FF2B5EF4-FFF2-40B4-BE49-F238E27FC236}">
+                <a16:creationId xmlns:a16="http://schemas.microsoft.com/office/drawing/2014/main" id="{C859E0BA-C13C-A240-882F-7AC8CF7CB665}"/>
               </a:ext>
             </a:extLst>
           </p:cNvPr>
@@ -3839,7 +3806,7 @@
         </p:blipFill>
         <p:spPr>
           <a:xfrm>
-            <a:off x="938802" y="3817645"/>
+            <a:off x="897110" y="3817645"/>
             <a:ext cx="2057400" cy="2743200"/>
           </a:xfrm>
           <a:prstGeom prst="rect">
@@ -3849,10 +3816,10 @@
       </p:pic>
       <p:pic>
         <p:nvPicPr>
-          <p:cNvPr id="20" name="Picture 19">
-            <a:extLst>
-              <a:ext uri="{FF2B5EF4-FFF2-40B4-BE49-F238E27FC236}">
-                <a16:creationId xmlns:a16="http://schemas.microsoft.com/office/drawing/2014/main" id="{834D61CF-A3AD-124B-BF36-809FF570FD14}"/>
+          <p:cNvPr id="19" name="Picture 18">
+            <a:extLst>
+              <a:ext uri="{FF2B5EF4-FFF2-40B4-BE49-F238E27FC236}">
+                <a16:creationId xmlns:a16="http://schemas.microsoft.com/office/drawing/2014/main" id="{D05C1715-2F2A-9448-B05A-32DED3747F55}"/>
               </a:ext>
             </a:extLst>
           </p:cNvPr>
@@ -3869,7 +3836,7 @@
         </p:blipFill>
         <p:spPr>
           <a:xfrm>
-            <a:off x="2996202" y="3817645"/>
+            <a:off x="2986882" y="3817645"/>
             <a:ext cx="2057400" cy="2743200"/>
           </a:xfrm>
           <a:prstGeom prst="rect">
@@ -3879,10 +3846,10 @@
       </p:pic>
       <p:pic>
         <p:nvPicPr>
-          <p:cNvPr id="23" name="Picture 22">
-            <a:extLst>
-              <a:ext uri="{FF2B5EF4-FFF2-40B4-BE49-F238E27FC236}">
-                <a16:creationId xmlns:a16="http://schemas.microsoft.com/office/drawing/2014/main" id="{636A5EB4-6008-B940-8C03-85F54E788D66}"/>
+          <p:cNvPr id="22" name="Picture 21">
+            <a:extLst>
+              <a:ext uri="{FF2B5EF4-FFF2-40B4-BE49-F238E27FC236}">
+                <a16:creationId xmlns:a16="http://schemas.microsoft.com/office/drawing/2014/main" id="{4838B0E5-A96A-274E-80CD-4B36510FE95F}"/>
               </a:ext>
             </a:extLst>
           </p:cNvPr>
@@ -3899,7 +3866,7 @@
         </p:blipFill>
         <p:spPr>
           <a:xfrm>
-            <a:off x="4998047" y="3817645"/>
+            <a:off x="4941301" y="3817645"/>
             <a:ext cx="2057400" cy="2743200"/>
           </a:xfrm>
           <a:prstGeom prst="rect">
@@ -3909,10 +3876,10 @@
       </p:pic>
       <p:pic>
         <p:nvPicPr>
-          <p:cNvPr id="25" name="Picture 24">
-            <a:extLst>
-              <a:ext uri="{FF2B5EF4-FFF2-40B4-BE49-F238E27FC236}">
-                <a16:creationId xmlns:a16="http://schemas.microsoft.com/office/drawing/2014/main" id="{FFE74CAD-9CE2-9046-ACD6-B46D0626D6B4}"/>
+          <p:cNvPr id="26" name="Picture 25">
+            <a:extLst>
+              <a:ext uri="{FF2B5EF4-FFF2-40B4-BE49-F238E27FC236}">
+                <a16:creationId xmlns:a16="http://schemas.microsoft.com/office/drawing/2014/main" id="{073AEA71-8E9C-6147-B881-1221D8435B27}"/>
               </a:ext>
             </a:extLst>
           </p:cNvPr>
@@ -3929,7 +3896,7 @@
         </p:blipFill>
         <p:spPr>
           <a:xfrm>
-            <a:off x="7000104" y="3817645"/>
+            <a:off x="6942934" y="3817645"/>
             <a:ext cx="2057400" cy="2743200"/>
           </a:xfrm>
           <a:prstGeom prst="rect">
@@ -3939,10 +3906,10 @@
       </p:pic>
       <p:pic>
         <p:nvPicPr>
-          <p:cNvPr id="28" name="Picture 27">
-            <a:extLst>
-              <a:ext uri="{FF2B5EF4-FFF2-40B4-BE49-F238E27FC236}">
-                <a16:creationId xmlns:a16="http://schemas.microsoft.com/office/drawing/2014/main" id="{1A93B226-A288-374A-BECE-048AC0A29FF4}"/>
+          <p:cNvPr id="29" name="Picture 28">
+            <a:extLst>
+              <a:ext uri="{FF2B5EF4-FFF2-40B4-BE49-F238E27FC236}">
+                <a16:creationId xmlns:a16="http://schemas.microsoft.com/office/drawing/2014/main" id="{608C5BCE-8480-5D47-AC70-8761563BF817}"/>
               </a:ext>
             </a:extLst>
           </p:cNvPr>
@@ -3959,7 +3926,7 @@
         </p:blipFill>
         <p:spPr>
           <a:xfrm>
-            <a:off x="9057186" y="3817645"/>
+            <a:off x="9055836" y="3817645"/>
             <a:ext cx="2057400" cy="2743200"/>
           </a:xfrm>
           <a:prstGeom prst="rect">
@@ -3967,10 +3934,716 @@
           </a:prstGeom>
         </p:spPr>
       </p:pic>
+      <p:sp>
+        <p:nvSpPr>
+          <p:cNvPr id="2" name="TextBox 1">
+            <a:extLst>
+              <a:ext uri="{FF2B5EF4-FFF2-40B4-BE49-F238E27FC236}">
+                <a16:creationId xmlns:a16="http://schemas.microsoft.com/office/drawing/2014/main" id="{9A260BA1-7B40-BA43-9619-2D760D0F2637}"/>
+              </a:ext>
+            </a:extLst>
+          </p:cNvPr>
+          <p:cNvSpPr txBox="1"/>
+          <p:nvPr/>
+        </p:nvSpPr>
+        <p:spPr>
+          <a:xfrm>
+            <a:off x="0" y="0"/>
+            <a:ext cx="5097780" cy="369332"/>
+          </a:xfrm>
+          <a:prstGeom prst="rect">
+            <a:avLst/>
+          </a:prstGeom>
+          <a:noFill/>
+        </p:spPr>
+        <p:txBody>
+          <a:bodyPr wrap="square" rtlCol="0">
+            <a:spAutoFit/>
+          </a:bodyPr>
+          <a:lstStyle/>
+          <a:p>
+            <a:r>
+              <a:rPr lang="en-US" dirty="0"/>
+              <a:t>LSR2</a:t>
+            </a:r>
+          </a:p>
+        </p:txBody>
+      </p:sp>
     </p:spTree>
     <p:extLst>
       <p:ext uri="{BB962C8B-B14F-4D97-AF65-F5344CB8AC3E}">
         <p14:creationId xmlns:p14="http://schemas.microsoft.com/office/powerpoint/2010/main" val="264582830"/>
+      </p:ext>
+    </p:extLst>
+  </p:cSld>
+  <p:clrMapOvr>
+    <a:masterClrMapping/>
+  </p:clrMapOvr>
+</p:sld>
+</file>
+
+<file path=ppt/slides/slide3.xml><?xml version="1.0" encoding="utf-8"?>
+<p:sld xmlns:a="http://schemas.openxmlformats.org/drawingml/2006/main" xmlns:r="http://schemas.openxmlformats.org/officeDocument/2006/relationships" xmlns:p="http://schemas.openxmlformats.org/presentationml/2006/main">
+  <p:cSld>
+    <p:spTree>
+      <p:nvGrpSpPr>
+        <p:cNvPr id="1" name=""/>
+        <p:cNvGrpSpPr/>
+        <p:nvPr/>
+      </p:nvGrpSpPr>
+      <p:grpSpPr>
+        <a:xfrm>
+          <a:off x="0" y="0"/>
+          <a:ext cx="0" cy="0"/>
+          <a:chOff x="0" y="0"/>
+          <a:chExt cx="0" cy="0"/>
+        </a:xfrm>
+      </p:grpSpPr>
+      <p:pic>
+        <p:nvPicPr>
+          <p:cNvPr id="4" name="Picture 3">
+            <a:extLst>
+              <a:ext uri="{FF2B5EF4-FFF2-40B4-BE49-F238E27FC236}">
+                <a16:creationId xmlns:a16="http://schemas.microsoft.com/office/drawing/2014/main" id="{EFB5F76C-AEF8-534F-A1B7-F069E9BFB44E}"/>
+              </a:ext>
+            </a:extLst>
+          </p:cNvPr>
+          <p:cNvPicPr>
+            <a:picLocks noChangeAspect="1"/>
+          </p:cNvPicPr>
+          <p:nvPr/>
+        </p:nvPicPr>
+        <p:blipFill>
+          <a:blip r:embed="rId2"/>
+          <a:stretch>
+            <a:fillRect/>
+          </a:stretch>
+        </p:blipFill>
+        <p:spPr>
+          <a:xfrm>
+            <a:off x="883300" y="1074445"/>
+            <a:ext cx="2057400" cy="2743200"/>
+          </a:xfrm>
+          <a:prstGeom prst="rect">
+            <a:avLst/>
+          </a:prstGeom>
+        </p:spPr>
+      </p:pic>
+      <p:pic>
+        <p:nvPicPr>
+          <p:cNvPr id="7" name="Picture 6">
+            <a:extLst>
+              <a:ext uri="{FF2B5EF4-FFF2-40B4-BE49-F238E27FC236}">
+                <a16:creationId xmlns:a16="http://schemas.microsoft.com/office/drawing/2014/main" id="{05B5DC53-4A0A-3A41-9188-0DB7D3D4AD6E}"/>
+              </a:ext>
+            </a:extLst>
+          </p:cNvPr>
+          <p:cNvPicPr>
+            <a:picLocks noChangeAspect="1"/>
+          </p:cNvPicPr>
+          <p:nvPr/>
+        </p:nvPicPr>
+        <p:blipFill>
+          <a:blip r:embed="rId3"/>
+          <a:stretch>
+            <a:fillRect/>
+          </a:stretch>
+        </p:blipFill>
+        <p:spPr>
+          <a:xfrm>
+            <a:off x="2968319" y="1074445"/>
+            <a:ext cx="2057400" cy="2743200"/>
+          </a:xfrm>
+          <a:prstGeom prst="rect">
+            <a:avLst/>
+          </a:prstGeom>
+        </p:spPr>
+      </p:pic>
+      <p:pic>
+        <p:nvPicPr>
+          <p:cNvPr id="10" name="Picture 9">
+            <a:extLst>
+              <a:ext uri="{FF2B5EF4-FFF2-40B4-BE49-F238E27FC236}">
+                <a16:creationId xmlns:a16="http://schemas.microsoft.com/office/drawing/2014/main" id="{D79A2120-726E-FF43-B978-5937FF6B5B59}"/>
+              </a:ext>
+            </a:extLst>
+          </p:cNvPr>
+          <p:cNvPicPr>
+            <a:picLocks noChangeAspect="1"/>
+          </p:cNvPicPr>
+          <p:nvPr/>
+        </p:nvPicPr>
+        <p:blipFill>
+          <a:blip r:embed="rId4"/>
+          <a:stretch>
+            <a:fillRect/>
+          </a:stretch>
+        </p:blipFill>
+        <p:spPr>
+          <a:xfrm>
+            <a:off x="4941977" y="1074445"/>
+            <a:ext cx="2057400" cy="2743200"/>
+          </a:xfrm>
+          <a:prstGeom prst="rect">
+            <a:avLst/>
+          </a:prstGeom>
+        </p:spPr>
+      </p:pic>
+      <p:pic>
+        <p:nvPicPr>
+          <p:cNvPr id="13" name="Picture 12">
+            <a:extLst>
+              <a:ext uri="{FF2B5EF4-FFF2-40B4-BE49-F238E27FC236}">
+                <a16:creationId xmlns:a16="http://schemas.microsoft.com/office/drawing/2014/main" id="{46D1CBBE-E152-A249-AA46-EAE5FD858062}"/>
+              </a:ext>
+            </a:extLst>
+          </p:cNvPr>
+          <p:cNvPicPr>
+            <a:picLocks noChangeAspect="1"/>
+          </p:cNvPicPr>
+          <p:nvPr/>
+        </p:nvPicPr>
+        <p:blipFill>
+          <a:blip r:embed="rId5"/>
+          <a:stretch>
+            <a:fillRect/>
+          </a:stretch>
+        </p:blipFill>
+        <p:spPr>
+          <a:xfrm>
+            <a:off x="6971388" y="1074445"/>
+            <a:ext cx="2057400" cy="2743200"/>
+          </a:xfrm>
+          <a:prstGeom prst="rect">
+            <a:avLst/>
+          </a:prstGeom>
+        </p:spPr>
+      </p:pic>
+      <p:pic>
+        <p:nvPicPr>
+          <p:cNvPr id="16" name="Picture 15">
+            <a:extLst>
+              <a:ext uri="{FF2B5EF4-FFF2-40B4-BE49-F238E27FC236}">
+                <a16:creationId xmlns:a16="http://schemas.microsoft.com/office/drawing/2014/main" id="{36E731A4-AEAA-5549-B7CF-5FD72AC724BB}"/>
+              </a:ext>
+            </a:extLst>
+          </p:cNvPr>
+          <p:cNvPicPr>
+            <a:picLocks noChangeAspect="1"/>
+          </p:cNvPicPr>
+          <p:nvPr/>
+        </p:nvPicPr>
+        <p:blipFill>
+          <a:blip r:embed="rId6"/>
+          <a:stretch>
+            <a:fillRect/>
+          </a:stretch>
+        </p:blipFill>
+        <p:spPr>
+          <a:xfrm>
+            <a:off x="896561" y="3817645"/>
+            <a:ext cx="2057400" cy="2743200"/>
+          </a:xfrm>
+          <a:prstGeom prst="rect">
+            <a:avLst/>
+          </a:prstGeom>
+        </p:spPr>
+      </p:pic>
+      <p:pic>
+        <p:nvPicPr>
+          <p:cNvPr id="19" name="Picture 18">
+            <a:extLst>
+              <a:ext uri="{FF2B5EF4-FFF2-40B4-BE49-F238E27FC236}">
+                <a16:creationId xmlns:a16="http://schemas.microsoft.com/office/drawing/2014/main" id="{993B2114-68BE-8B49-B446-6F2FEBC4B70C}"/>
+              </a:ext>
+            </a:extLst>
+          </p:cNvPr>
+          <p:cNvPicPr>
+            <a:picLocks noChangeAspect="1"/>
+          </p:cNvPicPr>
+          <p:nvPr/>
+        </p:nvPicPr>
+        <p:blipFill>
+          <a:blip r:embed="rId7"/>
+          <a:stretch>
+            <a:fillRect/>
+          </a:stretch>
+        </p:blipFill>
+        <p:spPr>
+          <a:xfrm>
+            <a:off x="2901335" y="3817645"/>
+            <a:ext cx="2057400" cy="2743200"/>
+          </a:xfrm>
+          <a:prstGeom prst="rect">
+            <a:avLst/>
+          </a:prstGeom>
+        </p:spPr>
+      </p:pic>
+      <p:pic>
+        <p:nvPicPr>
+          <p:cNvPr id="22" name="Picture 21">
+            <a:extLst>
+              <a:ext uri="{FF2B5EF4-FFF2-40B4-BE49-F238E27FC236}">
+                <a16:creationId xmlns:a16="http://schemas.microsoft.com/office/drawing/2014/main" id="{2CFAA041-9803-6744-8FE8-56446D0A6FE2}"/>
+              </a:ext>
+            </a:extLst>
+          </p:cNvPr>
+          <p:cNvPicPr>
+            <a:picLocks noChangeAspect="1"/>
+          </p:cNvPicPr>
+          <p:nvPr/>
+        </p:nvPicPr>
+        <p:blipFill>
+          <a:blip r:embed="rId8"/>
+          <a:stretch>
+            <a:fillRect/>
+          </a:stretch>
+        </p:blipFill>
+        <p:spPr>
+          <a:xfrm>
+            <a:off x="4930905" y="3817645"/>
+            <a:ext cx="2057400" cy="2743200"/>
+          </a:xfrm>
+          <a:prstGeom prst="rect">
+            <a:avLst/>
+          </a:prstGeom>
+        </p:spPr>
+      </p:pic>
+      <p:pic>
+        <p:nvPicPr>
+          <p:cNvPr id="26" name="Picture 25">
+            <a:extLst>
+              <a:ext uri="{FF2B5EF4-FFF2-40B4-BE49-F238E27FC236}">
+                <a16:creationId xmlns:a16="http://schemas.microsoft.com/office/drawing/2014/main" id="{A52810EB-7819-A64D-A9B8-186B14B04619}"/>
+              </a:ext>
+            </a:extLst>
+          </p:cNvPr>
+          <p:cNvPicPr>
+            <a:picLocks noChangeAspect="1"/>
+          </p:cNvPicPr>
+          <p:nvPr/>
+        </p:nvPicPr>
+        <p:blipFill>
+          <a:blip r:embed="rId9"/>
+          <a:stretch>
+            <a:fillRect/>
+          </a:stretch>
+        </p:blipFill>
+        <p:spPr>
+          <a:xfrm>
+            <a:off x="6921162" y="3817645"/>
+            <a:ext cx="2057400" cy="2743200"/>
+          </a:xfrm>
+          <a:prstGeom prst="rect">
+            <a:avLst/>
+          </a:prstGeom>
+        </p:spPr>
+      </p:pic>
+      <p:pic>
+        <p:nvPicPr>
+          <p:cNvPr id="29" name="Picture 28">
+            <a:extLst>
+              <a:ext uri="{FF2B5EF4-FFF2-40B4-BE49-F238E27FC236}">
+                <a16:creationId xmlns:a16="http://schemas.microsoft.com/office/drawing/2014/main" id="{CC54E03E-CCD0-5144-807C-A4340E48BE00}"/>
+              </a:ext>
+            </a:extLst>
+          </p:cNvPr>
+          <p:cNvPicPr>
+            <a:picLocks noChangeAspect="1"/>
+          </p:cNvPicPr>
+          <p:nvPr/>
+        </p:nvPicPr>
+        <p:blipFill>
+          <a:blip r:embed="rId10"/>
+          <a:stretch>
+            <a:fillRect/>
+          </a:stretch>
+        </p:blipFill>
+        <p:spPr>
+          <a:xfrm>
+            <a:off x="9057186" y="3817645"/>
+            <a:ext cx="2057400" cy="2743200"/>
+          </a:xfrm>
+          <a:prstGeom prst="rect">
+            <a:avLst/>
+          </a:prstGeom>
+        </p:spPr>
+      </p:pic>
+      <p:sp>
+        <p:nvSpPr>
+          <p:cNvPr id="2" name="TextBox 1">
+            <a:extLst>
+              <a:ext uri="{FF2B5EF4-FFF2-40B4-BE49-F238E27FC236}">
+                <a16:creationId xmlns:a16="http://schemas.microsoft.com/office/drawing/2014/main" id="{9A260BA1-7B40-BA43-9619-2D760D0F2637}"/>
+              </a:ext>
+            </a:extLst>
+          </p:cNvPr>
+          <p:cNvSpPr txBox="1"/>
+          <p:nvPr/>
+        </p:nvSpPr>
+        <p:spPr>
+          <a:xfrm>
+            <a:off x="0" y="0"/>
+            <a:ext cx="5097780" cy="369332"/>
+          </a:xfrm>
+          <a:prstGeom prst="rect">
+            <a:avLst/>
+          </a:prstGeom>
+          <a:noFill/>
+        </p:spPr>
+        <p:txBody>
+          <a:bodyPr wrap="square" rtlCol="0">
+            <a:spAutoFit/>
+          </a:bodyPr>
+          <a:lstStyle/>
+          <a:p>
+            <a:r>
+              <a:rPr lang="en-US" dirty="0"/>
+              <a:t>Aria</a:t>
+            </a:r>
+          </a:p>
+        </p:txBody>
+      </p:sp>
+    </p:spTree>
+    <p:extLst>
+      <p:ext uri="{BB962C8B-B14F-4D97-AF65-F5344CB8AC3E}">
+        <p14:creationId xmlns:p14="http://schemas.microsoft.com/office/powerpoint/2010/main" val="3621522576"/>
+      </p:ext>
+    </p:extLst>
+  </p:cSld>
+  <p:clrMapOvr>
+    <a:masterClrMapping/>
+  </p:clrMapOvr>
+</p:sld>
+</file>
+
+<file path=ppt/slides/slide4.xml><?xml version="1.0" encoding="utf-8"?>
+<p:sld xmlns:a="http://schemas.openxmlformats.org/drawingml/2006/main" xmlns:r="http://schemas.openxmlformats.org/officeDocument/2006/relationships" xmlns:p="http://schemas.openxmlformats.org/presentationml/2006/main">
+  <p:cSld>
+    <p:spTree>
+      <p:nvGrpSpPr>
+        <p:cNvPr id="1" name=""/>
+        <p:cNvGrpSpPr/>
+        <p:nvPr/>
+      </p:nvGrpSpPr>
+      <p:grpSpPr>
+        <a:xfrm>
+          <a:off x="0" y="0"/>
+          <a:ext cx="0" cy="0"/>
+          <a:chOff x="0" y="0"/>
+          <a:chExt cx="0" cy="0"/>
+        </a:xfrm>
+      </p:grpSpPr>
+      <p:pic>
+        <p:nvPicPr>
+          <p:cNvPr id="31" name="Picture 30">
+            <a:extLst>
+              <a:ext uri="{FF2B5EF4-FFF2-40B4-BE49-F238E27FC236}">
+                <a16:creationId xmlns:a16="http://schemas.microsoft.com/office/drawing/2014/main" id="{0F65F571-5CEC-8D4B-9A85-0818EE52A545}"/>
+              </a:ext>
+            </a:extLst>
+          </p:cNvPr>
+          <p:cNvPicPr>
+            <a:picLocks noChangeAspect="1"/>
+          </p:cNvPicPr>
+          <p:nvPr/>
+        </p:nvPicPr>
+        <p:blipFill>
+          <a:blip r:embed="rId2"/>
+          <a:stretch>
+            <a:fillRect/>
+          </a:stretch>
+        </p:blipFill>
+        <p:spPr>
+          <a:xfrm>
+            <a:off x="9007801" y="3817645"/>
+            <a:ext cx="2057400" cy="2743200"/>
+          </a:xfrm>
+          <a:prstGeom prst="rect">
+            <a:avLst/>
+          </a:prstGeom>
+        </p:spPr>
+      </p:pic>
+      <p:pic>
+        <p:nvPicPr>
+          <p:cNvPr id="33" name="Picture 32">
+            <a:extLst>
+              <a:ext uri="{FF2B5EF4-FFF2-40B4-BE49-F238E27FC236}">
+                <a16:creationId xmlns:a16="http://schemas.microsoft.com/office/drawing/2014/main" id="{F0EAC1E0-5394-D248-80B1-DA915396031A}"/>
+              </a:ext>
+            </a:extLst>
+          </p:cNvPr>
+          <p:cNvPicPr>
+            <a:picLocks noChangeAspect="1"/>
+          </p:cNvPicPr>
+          <p:nvPr/>
+        </p:nvPicPr>
+        <p:blipFill>
+          <a:blip r:embed="rId3"/>
+          <a:stretch>
+            <a:fillRect/>
+          </a:stretch>
+        </p:blipFill>
+        <p:spPr>
+          <a:xfrm>
+            <a:off x="6929058" y="3817645"/>
+            <a:ext cx="2057400" cy="2743200"/>
+          </a:xfrm>
+          <a:prstGeom prst="rect">
+            <a:avLst/>
+          </a:prstGeom>
+        </p:spPr>
+      </p:pic>
+      <p:pic>
+        <p:nvPicPr>
+          <p:cNvPr id="35" name="Picture 34">
+            <a:extLst>
+              <a:ext uri="{FF2B5EF4-FFF2-40B4-BE49-F238E27FC236}">
+                <a16:creationId xmlns:a16="http://schemas.microsoft.com/office/drawing/2014/main" id="{2E4C8841-325C-034F-B37F-A00BE531101C}"/>
+              </a:ext>
+            </a:extLst>
+          </p:cNvPr>
+          <p:cNvPicPr>
+            <a:picLocks noChangeAspect="1"/>
+          </p:cNvPicPr>
+          <p:nvPr/>
+        </p:nvPicPr>
+        <p:blipFill>
+          <a:blip r:embed="rId4"/>
+          <a:stretch>
+            <a:fillRect/>
+          </a:stretch>
+        </p:blipFill>
+        <p:spPr>
+          <a:xfrm>
+            <a:off x="4913392" y="3817645"/>
+            <a:ext cx="2057400" cy="2743200"/>
+          </a:xfrm>
+          <a:prstGeom prst="rect">
+            <a:avLst/>
+          </a:prstGeom>
+        </p:spPr>
+      </p:pic>
+      <p:pic>
+        <p:nvPicPr>
+          <p:cNvPr id="37" name="Picture 36">
+            <a:extLst>
+              <a:ext uri="{FF2B5EF4-FFF2-40B4-BE49-F238E27FC236}">
+                <a16:creationId xmlns:a16="http://schemas.microsoft.com/office/drawing/2014/main" id="{91C13B51-BB29-0D43-8516-782D2B400B1F}"/>
+              </a:ext>
+            </a:extLst>
+          </p:cNvPr>
+          <p:cNvPicPr>
+            <a:picLocks noChangeAspect="1"/>
+          </p:cNvPicPr>
+          <p:nvPr/>
+        </p:nvPicPr>
+        <p:blipFill>
+          <a:blip r:embed="rId5"/>
+          <a:stretch>
+            <a:fillRect/>
+          </a:stretch>
+        </p:blipFill>
+        <p:spPr>
+          <a:xfrm>
+            <a:off x="2957436" y="3817645"/>
+            <a:ext cx="2057400" cy="2743200"/>
+          </a:xfrm>
+          <a:prstGeom prst="rect">
+            <a:avLst/>
+          </a:prstGeom>
+        </p:spPr>
+      </p:pic>
+      <p:pic>
+        <p:nvPicPr>
+          <p:cNvPr id="39" name="Picture 38">
+            <a:extLst>
+              <a:ext uri="{FF2B5EF4-FFF2-40B4-BE49-F238E27FC236}">
+                <a16:creationId xmlns:a16="http://schemas.microsoft.com/office/drawing/2014/main" id="{D4A74BDC-D27E-AE41-AEC7-39D934D156AC}"/>
+              </a:ext>
+            </a:extLst>
+          </p:cNvPr>
+          <p:cNvPicPr>
+            <a:picLocks noChangeAspect="1"/>
+          </p:cNvPicPr>
+          <p:nvPr/>
+        </p:nvPicPr>
+        <p:blipFill>
+          <a:blip r:embed="rId6"/>
+          <a:stretch>
+            <a:fillRect/>
+          </a:stretch>
+        </p:blipFill>
+        <p:spPr>
+          <a:xfrm>
+            <a:off x="798751" y="3817645"/>
+            <a:ext cx="2057400" cy="2743200"/>
+          </a:xfrm>
+          <a:prstGeom prst="rect">
+            <a:avLst/>
+          </a:prstGeom>
+        </p:spPr>
+      </p:pic>
+      <p:pic>
+        <p:nvPicPr>
+          <p:cNvPr id="4" name="Picture 3">
+            <a:extLst>
+              <a:ext uri="{FF2B5EF4-FFF2-40B4-BE49-F238E27FC236}">
+                <a16:creationId xmlns:a16="http://schemas.microsoft.com/office/drawing/2014/main" id="{54342C70-454B-4848-BEE9-800C5D55563A}"/>
+              </a:ext>
+            </a:extLst>
+          </p:cNvPr>
+          <p:cNvPicPr>
+            <a:picLocks noChangeAspect="1"/>
+          </p:cNvPicPr>
+          <p:nvPr/>
+        </p:nvPicPr>
+        <p:blipFill>
+          <a:blip r:embed="rId7"/>
+          <a:stretch>
+            <a:fillRect/>
+          </a:stretch>
+        </p:blipFill>
+        <p:spPr>
+          <a:xfrm>
+            <a:off x="882665" y="1074445"/>
+            <a:ext cx="2057400" cy="2743200"/>
+          </a:xfrm>
+          <a:prstGeom prst="rect">
+            <a:avLst/>
+          </a:prstGeom>
+        </p:spPr>
+      </p:pic>
+      <p:pic>
+        <p:nvPicPr>
+          <p:cNvPr id="7" name="Picture 6">
+            <a:extLst>
+              <a:ext uri="{FF2B5EF4-FFF2-40B4-BE49-F238E27FC236}">
+                <a16:creationId xmlns:a16="http://schemas.microsoft.com/office/drawing/2014/main" id="{EFA95C1D-D84A-E24A-8248-6CCDD90D380D}"/>
+              </a:ext>
+            </a:extLst>
+          </p:cNvPr>
+          <p:cNvPicPr>
+            <a:picLocks noChangeAspect="1"/>
+          </p:cNvPicPr>
+          <p:nvPr/>
+        </p:nvPicPr>
+        <p:blipFill>
+          <a:blip r:embed="rId8"/>
+          <a:stretch>
+            <a:fillRect/>
+          </a:stretch>
+        </p:blipFill>
+        <p:spPr>
+          <a:xfrm>
+            <a:off x="2968266" y="1074445"/>
+            <a:ext cx="2057400" cy="2743200"/>
+          </a:xfrm>
+          <a:prstGeom prst="rect">
+            <a:avLst/>
+          </a:prstGeom>
+        </p:spPr>
+      </p:pic>
+      <p:pic>
+        <p:nvPicPr>
+          <p:cNvPr id="10" name="Picture 9">
+            <a:extLst>
+              <a:ext uri="{FF2B5EF4-FFF2-40B4-BE49-F238E27FC236}">
+                <a16:creationId xmlns:a16="http://schemas.microsoft.com/office/drawing/2014/main" id="{997FA5F3-19BA-7C4D-AD2D-5E008537D904}"/>
+              </a:ext>
+            </a:extLst>
+          </p:cNvPr>
+          <p:cNvPicPr>
+            <a:picLocks noChangeAspect="1"/>
+          </p:cNvPicPr>
+          <p:nvPr/>
+        </p:nvPicPr>
+        <p:blipFill>
+          <a:blip r:embed="rId9"/>
+          <a:stretch>
+            <a:fillRect/>
+          </a:stretch>
+        </p:blipFill>
+        <p:spPr>
+          <a:xfrm>
+            <a:off x="4914662" y="1074445"/>
+            <a:ext cx="2057400" cy="2743200"/>
+          </a:xfrm>
+          <a:prstGeom prst="rect">
+            <a:avLst/>
+          </a:prstGeom>
+        </p:spPr>
+      </p:pic>
+      <p:pic>
+        <p:nvPicPr>
+          <p:cNvPr id="13" name="Picture 12">
+            <a:extLst>
+              <a:ext uri="{FF2B5EF4-FFF2-40B4-BE49-F238E27FC236}">
+                <a16:creationId xmlns:a16="http://schemas.microsoft.com/office/drawing/2014/main" id="{4A0665A8-9B38-F44F-A1B9-3CC04ED63307}"/>
+              </a:ext>
+            </a:extLst>
+          </p:cNvPr>
+          <p:cNvPicPr>
+            <a:picLocks noChangeAspect="1"/>
+          </p:cNvPicPr>
+          <p:nvPr/>
+        </p:nvPicPr>
+        <p:blipFill>
+          <a:blip r:embed="rId10"/>
+          <a:stretch>
+            <a:fillRect/>
+          </a:stretch>
+        </p:blipFill>
+        <p:spPr>
+          <a:xfrm>
+            <a:off x="6971903" y="1074445"/>
+            <a:ext cx="2057400" cy="2743200"/>
+          </a:xfrm>
+          <a:prstGeom prst="rect">
+            <a:avLst/>
+          </a:prstGeom>
+        </p:spPr>
+      </p:pic>
+      <p:sp>
+        <p:nvSpPr>
+          <p:cNvPr id="2" name="TextBox 1">
+            <a:extLst>
+              <a:ext uri="{FF2B5EF4-FFF2-40B4-BE49-F238E27FC236}">
+                <a16:creationId xmlns:a16="http://schemas.microsoft.com/office/drawing/2014/main" id="{9A260BA1-7B40-BA43-9619-2D760D0F2637}"/>
+              </a:ext>
+            </a:extLst>
+          </p:cNvPr>
+          <p:cNvSpPr txBox="1"/>
+          <p:nvPr/>
+        </p:nvSpPr>
+        <p:spPr>
+          <a:xfrm>
+            <a:off x="0" y="0"/>
+            <a:ext cx="5097780" cy="369332"/>
+          </a:xfrm>
+          <a:prstGeom prst="rect">
+            <a:avLst/>
+          </a:prstGeom>
+          <a:noFill/>
+        </p:spPr>
+        <p:txBody>
+          <a:bodyPr wrap="square" rtlCol="0">
+            <a:spAutoFit/>
+          </a:bodyPr>
+          <a:lstStyle/>
+          <a:p>
+            <a:r>
+              <a:rPr lang="en-US" dirty="0" err="1"/>
+              <a:t>Aria_sorp</a:t>
+            </a:r>
+            <a:endParaRPr lang="en-US" dirty="0"/>
+          </a:p>
+        </p:txBody>
+      </p:sp>
+    </p:spTree>
+    <p:extLst>
+      <p:ext uri="{BB962C8B-B14F-4D97-AF65-F5344CB8AC3E}">
+        <p14:creationId xmlns:p14="http://schemas.microsoft.com/office/powerpoint/2010/main" val="1717212473"/>
       </p:ext>
     </p:extLst>
   </p:cSld>

</xml_diff>